<commit_message>
check in changes made last summer to slides and notes
</commit_message>
<xml_diff>
--- a/amta2012/hands-on.2012.pptx
+++ b/amta2012/hands-on.2012.pptx
@@ -208,7 +208,7 @@
             <a:fld id="{A21CD23E-9C6D-3F4E-B356-8B36A5E4D680}" type="datetimeFigureOut">
               <a:rPr lang="en-US" smtClean="0"/>
               <a:pPr/>
-              <a:t>31/10/2012</a:t>
+              <a:t>01/11/2012</a:t>
             </a:fld>
             <a:endParaRPr lang="en-US"/>
           </a:p>
@@ -2487,7 +2487,7 @@
             <a:fld id="{91D24437-2522-E94A-8E59-511AAB2326EA}" type="datetimeFigureOut">
               <a:rPr lang="en-US" smtClean="0"/>
               <a:pPr/>
-              <a:t>31/10/2012</a:t>
+              <a:t>01/11/2012</a:t>
             </a:fld>
             <a:endParaRPr lang="en-US"/>
           </a:p>
@@ -2654,7 +2654,7 @@
             <a:fld id="{91D24437-2522-E94A-8E59-511AAB2326EA}" type="datetimeFigureOut">
               <a:rPr lang="en-US" smtClean="0"/>
               <a:pPr/>
-              <a:t>31/10/2012</a:t>
+              <a:t>01/11/2012</a:t>
             </a:fld>
             <a:endParaRPr lang="en-US"/>
           </a:p>
@@ -2831,7 +2831,7 @@
             <a:fld id="{91D24437-2522-E94A-8E59-511AAB2326EA}" type="datetimeFigureOut">
               <a:rPr lang="en-US" smtClean="0"/>
               <a:pPr/>
-              <a:t>31/10/2012</a:t>
+              <a:t>01/11/2012</a:t>
             </a:fld>
             <a:endParaRPr lang="en-US"/>
           </a:p>
@@ -2998,7 +2998,7 @@
             <a:fld id="{91D24437-2522-E94A-8E59-511AAB2326EA}" type="datetimeFigureOut">
               <a:rPr lang="en-US" smtClean="0"/>
               <a:pPr/>
-              <a:t>31/10/2012</a:t>
+              <a:t>01/11/2012</a:t>
             </a:fld>
             <a:endParaRPr lang="en-US"/>
           </a:p>
@@ -3241,7 +3241,7 @@
             <a:fld id="{91D24437-2522-E94A-8E59-511AAB2326EA}" type="datetimeFigureOut">
               <a:rPr lang="en-US" smtClean="0"/>
               <a:pPr/>
-              <a:t>31/10/2012</a:t>
+              <a:t>01/11/2012</a:t>
             </a:fld>
             <a:endParaRPr lang="en-US"/>
           </a:p>
@@ -3526,7 +3526,7 @@
             <a:fld id="{91D24437-2522-E94A-8E59-511AAB2326EA}" type="datetimeFigureOut">
               <a:rPr lang="en-US" smtClean="0"/>
               <a:pPr/>
-              <a:t>31/10/2012</a:t>
+              <a:t>01/11/2012</a:t>
             </a:fld>
             <a:endParaRPr lang="en-US"/>
           </a:p>
@@ -3945,7 +3945,7 @@
             <a:fld id="{91D24437-2522-E94A-8E59-511AAB2326EA}" type="datetimeFigureOut">
               <a:rPr lang="en-US" smtClean="0"/>
               <a:pPr/>
-              <a:t>31/10/2012</a:t>
+              <a:t>01/11/2012</a:t>
             </a:fld>
             <a:endParaRPr lang="en-US"/>
           </a:p>
@@ -4060,7 +4060,7 @@
             <a:fld id="{91D24437-2522-E94A-8E59-511AAB2326EA}" type="datetimeFigureOut">
               <a:rPr lang="en-US" smtClean="0"/>
               <a:pPr/>
-              <a:t>31/10/2012</a:t>
+              <a:t>01/11/2012</a:t>
             </a:fld>
             <a:endParaRPr lang="en-US"/>
           </a:p>
@@ -4152,7 +4152,7 @@
             <a:fld id="{91D24437-2522-E94A-8E59-511AAB2326EA}" type="datetimeFigureOut">
               <a:rPr lang="en-US" smtClean="0"/>
               <a:pPr/>
-              <a:t>31/10/2012</a:t>
+              <a:t>01/11/2012</a:t>
             </a:fld>
             <a:endParaRPr lang="en-US"/>
           </a:p>
@@ -4426,7 +4426,7 @@
             <a:fld id="{91D24437-2522-E94A-8E59-511AAB2326EA}" type="datetimeFigureOut">
               <a:rPr lang="en-US" smtClean="0"/>
               <a:pPr/>
-              <a:t>31/10/2012</a:t>
+              <a:t>01/11/2012</a:t>
             </a:fld>
             <a:endParaRPr lang="en-US"/>
           </a:p>
@@ -4676,7 +4676,7 @@
             <a:fld id="{91D24437-2522-E94A-8E59-511AAB2326EA}" type="datetimeFigureOut">
               <a:rPr lang="en-US" smtClean="0"/>
               <a:pPr/>
-              <a:t>31/10/2012</a:t>
+              <a:t>01/11/2012</a:t>
             </a:fld>
             <a:endParaRPr lang="en-US"/>
           </a:p>
@@ -4886,7 +4886,7 @@
             <a:fld id="{91D24437-2522-E94A-8E59-511AAB2326EA}" type="datetimeFigureOut">
               <a:rPr lang="en-US" smtClean="0"/>
               <a:pPr/>
-              <a:t>31/10/2012</a:t>
+              <a:t>01/11/2012</a:t>
             </a:fld>
             <a:endParaRPr lang="en-US"/>
           </a:p>
@@ -5444,6 +5444,13 @@
   <p:clrMapOvr>
     <a:masterClrMapping/>
   </p:clrMapOvr>
+  <p:timing>
+    <p:tnLst>
+      <p:par>
+        <p:cTn xmlns:p14="http://schemas.microsoft.com/office/powerpoint/2010/main" id="1" dur="indefinite" restart="never" nodeType="tmRoot"/>
+      </p:par>
+    </p:tnLst>
+  </p:timing>
 </p:sld>
 </file>
 
@@ -7329,6 +7336,13 @@
   <p:clrMapOvr>
     <a:masterClrMapping/>
   </p:clrMapOvr>
+  <p:timing>
+    <p:tnLst>
+      <p:par>
+        <p:cTn xmlns:p14="http://schemas.microsoft.com/office/powerpoint/2010/main" id="1" dur="indefinite" restart="never" nodeType="tmRoot"/>
+      </p:par>
+    </p:tnLst>
+  </p:timing>
 </p:sld>
 </file>
 
@@ -7387,19 +7401,17 @@
         <p:spPr/>
         <p:txBody>
           <a:bodyPr>
-            <a:normAutofit fontScale="92500" lnSpcReduction="20000"/>
+            <a:normAutofit lnSpcReduction="10000"/>
           </a:bodyPr>
           <a:lstStyle/>
           <a:p>
             <a:r>
               <a:rPr lang="en-US" dirty="0" smtClean="0"/>
-              <a:t>More details later….</a:t>
-            </a:r>
-          </a:p>
-          <a:p>
-            <a:r>
-              <a:rPr lang="en-US" dirty="0" smtClean="0"/>
-              <a:t>In brief </a:t>
+              <a:t>In </a:t>
+            </a:r>
+            <a:r>
+              <a:rPr lang="en-US" dirty="0" smtClean="0"/>
+              <a:t>brief </a:t>
             </a:r>
           </a:p>
           <a:p>
@@ -7471,6 +7483,13 @@
   <p:clrMapOvr>
     <a:masterClrMapping/>
   </p:clrMapOvr>
+  <p:timing>
+    <p:tnLst>
+      <p:par>
+        <p:cTn xmlns:p14="http://schemas.microsoft.com/office/powerpoint/2010/main" id="1" dur="indefinite" restart="never" nodeType="tmRoot"/>
+      </p:par>
+    </p:tnLst>
+  </p:timing>
 </p:sld>
 </file>
 
@@ -7569,7 +7588,19 @@
             </a:pPr>
             <a:r>
               <a:rPr lang="en-US" dirty="0" smtClean="0"/>
-              <a:t>cd workspace/exp/</a:t>
+              <a:t>cd workspace/</a:t>
+            </a:r>
+            <a:r>
+              <a:rPr lang="en-US" dirty="0" smtClean="0"/>
+              <a:t>experiment/</a:t>
+            </a:r>
+            <a:r>
+              <a:rPr lang="en-US" dirty="0" err="1" smtClean="0"/>
+              <a:t>fr</a:t>
+            </a:r>
+            <a:r>
+              <a:rPr lang="en-US" dirty="0" smtClean="0"/>
+              <a:t>-en/</a:t>
             </a:r>
             <a:r>
               <a:rPr lang="en-US" dirty="0" smtClean="0">
@@ -7581,8 +7612,9 @@
             </a:r>
             <a:r>
               <a:rPr lang="en-US" dirty="0" smtClean="0"/>
-              <a:t>/working-dir</a:t>
-            </a:r>
+              <a:t>/</a:t>
+            </a:r>
+            <a:endParaRPr lang="en-US" dirty="0" smtClean="0"/>
           </a:p>
           <a:p>
             <a:pPr>
@@ -7598,7 +7630,15 @@
             </a:r>
             <a:r>
               <a:rPr lang="en-US" dirty="0" smtClean="0"/>
-              <a:t> ../</a:t>
+              <a:t> </a:t>
+            </a:r>
+            <a:r>
+              <a:rPr lang="en-US" dirty="0" smtClean="0"/>
+              <a:t> .</a:t>
+            </a:r>
+            <a:r>
+              <a:rPr lang="en-US" dirty="0" smtClean="0"/>
+              <a:t>/</a:t>
             </a:r>
             <a:r>
               <a:rPr lang="en-US" dirty="0" err="1" smtClean="0"/>
@@ -7795,6 +7835,13 @@
   <p:clrMapOvr>
     <a:masterClrMapping/>
   </p:clrMapOvr>
+  <p:timing>
+    <p:tnLst>
+      <p:par>
+        <p:cTn xmlns:p14="http://schemas.microsoft.com/office/powerpoint/2010/main" id="1" dur="indefinite" restart="never" nodeType="tmRoot"/>
+      </p:par>
+    </p:tnLst>
+  </p:timing>
 </p:sld>
 </file>
 
@@ -7867,6 +7914,13 @@
   <p:clrMapOvr>
     <a:masterClrMapping/>
   </p:clrMapOvr>
+  <p:timing>
+    <p:tnLst>
+      <p:par>
+        <p:cTn xmlns:p14="http://schemas.microsoft.com/office/powerpoint/2010/main" id="1" dur="indefinite" restart="never" nodeType="tmRoot"/>
+      </p:par>
+    </p:tnLst>
+  </p:timing>
 </p:sld>
 </file>
 
@@ -7984,6 +8038,13 @@
   <p:clrMapOvr>
     <a:masterClrMapping/>
   </p:clrMapOvr>
+  <p:timing>
+    <p:tnLst>
+      <p:par>
+        <p:cTn xmlns:p14="http://schemas.microsoft.com/office/powerpoint/2010/main" id="1" dur="indefinite" restart="never" nodeType="tmRoot"/>
+      </p:par>
+    </p:tnLst>
+  </p:timing>
 </p:sld>
 </file>
 
@@ -8050,8 +8111,16 @@
               <a:t>nohup</a:t>
             </a:r>
             <a:r>
-              <a:rPr lang="en-US" dirty="0" smtClean="0"/>
-              <a:t> ../</a:t>
+              <a:rPr lang="en-US" smtClean="0"/>
+              <a:t> </a:t>
+            </a:r>
+            <a:r>
+              <a:rPr lang="en-US" smtClean="0"/>
+              <a:t>.</a:t>
+            </a:r>
+            <a:r>
+              <a:rPr lang="en-US" dirty="0" smtClean="0"/>
+              <a:t>/</a:t>
             </a:r>
             <a:r>
               <a:rPr lang="en-US" dirty="0" err="1" smtClean="0"/>
@@ -8212,6 +8281,13 @@
   <p:clrMapOvr>
     <a:masterClrMapping/>
   </p:clrMapOvr>
+  <p:timing>
+    <p:tnLst>
+      <p:par>
+        <p:cTn xmlns:p14="http://schemas.microsoft.com/office/powerpoint/2010/main" id="1" dur="indefinite" restart="never" nodeType="tmRoot"/>
+      </p:par>
+    </p:tnLst>
+  </p:timing>
 </p:sld>
 </file>
 
@@ -8284,6 +8360,13 @@
   <p:clrMapOvr>
     <a:masterClrMapping/>
   </p:clrMapOvr>
+  <p:timing>
+    <p:tnLst>
+      <p:par>
+        <p:cTn xmlns:p14="http://schemas.microsoft.com/office/powerpoint/2010/main" id="1" dur="indefinite" restart="never" nodeType="tmRoot"/>
+      </p:par>
+    </p:tnLst>
+  </p:timing>
 </p:sld>
 </file>
 
@@ -8442,6 +8525,13 @@
   <p:clrMapOvr>
     <a:masterClrMapping/>
   </p:clrMapOvr>
+  <p:timing>
+    <p:tnLst>
+      <p:par>
+        <p:cTn xmlns:p14="http://schemas.microsoft.com/office/powerpoint/2010/main" id="1" dur="indefinite" restart="never" nodeType="tmRoot"/>
+      </p:par>
+    </p:tnLst>
+  </p:timing>
 </p:sld>
 </file>
 

</xml_diff>